<commit_message>
updating with code files
</commit_message>
<xml_diff>
--- a/Intro to Software Engineering CSC 212-90/Poster/tutorPoster.pptx
+++ b/Intro to Software Engineering CSC 212-90/Poster/tutorPoster.pptx
@@ -133,218 +133,6 @@
 </p1510:revInfo>
 </file>
 
-<file path=ppt/changesInfos/changesInfo1.xml><?xml version="1.0" encoding="utf-8"?>
-<pc:chgInfo xmlns:a="http://schemas.openxmlformats.org/drawingml/2006/main" xmlns:r="http://schemas.openxmlformats.org/officeDocument/2006/relationships" xmlns:ac="http://schemas.microsoft.com/office/drawing/2013/main/command" xmlns:pc="http://schemas.microsoft.com/office/powerpoint/2013/main/command">
-  <pc:docChgLst>
-    <pc:chgData name="James Stevens" userId="c3e9a4fd0bc3e3ee" providerId="LiveId" clId="{C15F7F37-D4B4-4B60-873D-A3281FFED6D6}"/>
-    <pc:docChg chg="undo custSel addSld modSld">
-      <pc:chgData name="James Stevens" userId="c3e9a4fd0bc3e3ee" providerId="LiveId" clId="{C15F7F37-D4B4-4B60-873D-A3281FFED6D6}" dt="2025-03-19T23:37:07.572" v="4007" actId="20577"/>
-      <pc:docMkLst>
-        <pc:docMk/>
-      </pc:docMkLst>
-      <pc:sldChg chg="modSp">
-        <pc:chgData name="James Stevens" userId="c3e9a4fd0bc3e3ee" providerId="LiveId" clId="{C15F7F37-D4B4-4B60-873D-A3281FFED6D6}" dt="2025-03-18T23:32:57.576" v="606" actId="20577"/>
-        <pc:sldMkLst>
-          <pc:docMk/>
-          <pc:sldMk cId="3692083263" sldId="256"/>
-        </pc:sldMkLst>
-        <pc:spChg chg="mod">
-          <ac:chgData name="James Stevens" userId="c3e9a4fd0bc3e3ee" providerId="LiveId" clId="{C15F7F37-D4B4-4B60-873D-A3281FFED6D6}" dt="2025-03-18T23:32:57.576" v="606" actId="20577"/>
-          <ac:spMkLst>
-            <pc:docMk/>
-            <pc:sldMk cId="3692083263" sldId="256"/>
-            <ac:spMk id="3" creationId="{A8A4DE6B-CF75-B8F8-FE4A-5E6D426B4304}"/>
-          </ac:spMkLst>
-        </pc:spChg>
-      </pc:sldChg>
-      <pc:sldChg chg="modSp new mod">
-        <pc:chgData name="James Stevens" userId="c3e9a4fd0bc3e3ee" providerId="LiveId" clId="{C15F7F37-D4B4-4B60-873D-A3281FFED6D6}" dt="2025-03-18T23:49:07.069" v="1051" actId="20577"/>
-        <pc:sldMkLst>
-          <pc:docMk/>
-          <pc:sldMk cId="486984050" sldId="257"/>
-        </pc:sldMkLst>
-        <pc:spChg chg="mod">
-          <ac:chgData name="James Stevens" userId="c3e9a4fd0bc3e3ee" providerId="LiveId" clId="{C15F7F37-D4B4-4B60-873D-A3281FFED6D6}" dt="2025-03-17T23:33:39.740" v="12" actId="20577"/>
-          <ac:spMkLst>
-            <pc:docMk/>
-            <pc:sldMk cId="486984050" sldId="257"/>
-            <ac:spMk id="2" creationId="{49B2C265-3EE3-9295-538A-C4C540EB7E23}"/>
-          </ac:spMkLst>
-        </pc:spChg>
-        <pc:spChg chg="mod">
-          <ac:chgData name="James Stevens" userId="c3e9a4fd0bc3e3ee" providerId="LiveId" clId="{C15F7F37-D4B4-4B60-873D-A3281FFED6D6}" dt="2025-03-18T23:49:07.069" v="1051" actId="20577"/>
-          <ac:spMkLst>
-            <pc:docMk/>
-            <pc:sldMk cId="486984050" sldId="257"/>
-            <ac:spMk id="3" creationId="{387A0159-64E6-5058-879C-F2EA2A952B6C}"/>
-          </ac:spMkLst>
-        </pc:spChg>
-      </pc:sldChg>
-      <pc:sldChg chg="modSp new mod">
-        <pc:chgData name="James Stevens" userId="c3e9a4fd0bc3e3ee" providerId="LiveId" clId="{C15F7F37-D4B4-4B60-873D-A3281FFED6D6}" dt="2025-03-18T23:53:45.488" v="1338" actId="20577"/>
-        <pc:sldMkLst>
-          <pc:docMk/>
-          <pc:sldMk cId="50713563" sldId="258"/>
-        </pc:sldMkLst>
-        <pc:spChg chg="mod">
-          <ac:chgData name="James Stevens" userId="c3e9a4fd0bc3e3ee" providerId="LiveId" clId="{C15F7F37-D4B4-4B60-873D-A3281FFED6D6}" dt="2025-03-18T23:33:49.562" v="617" actId="20577"/>
-          <ac:spMkLst>
-            <pc:docMk/>
-            <pc:sldMk cId="50713563" sldId="258"/>
-            <ac:spMk id="2" creationId="{F229E600-B049-2340-F402-E30383112230}"/>
-          </ac:spMkLst>
-        </pc:spChg>
-        <pc:spChg chg="mod">
-          <ac:chgData name="James Stevens" userId="c3e9a4fd0bc3e3ee" providerId="LiveId" clId="{C15F7F37-D4B4-4B60-873D-A3281FFED6D6}" dt="2025-03-18T23:53:45.488" v="1338" actId="20577"/>
-          <ac:spMkLst>
-            <pc:docMk/>
-            <pc:sldMk cId="50713563" sldId="258"/>
-            <ac:spMk id="3" creationId="{3B614977-DEAA-CED8-8257-A0E10A5DE0BB}"/>
-          </ac:spMkLst>
-        </pc:spChg>
-      </pc:sldChg>
-      <pc:sldChg chg="modSp new mod">
-        <pc:chgData name="James Stevens" userId="c3e9a4fd0bc3e3ee" providerId="LiveId" clId="{C15F7F37-D4B4-4B60-873D-A3281FFED6D6}" dt="2025-03-19T00:05:04.703" v="1965" actId="20577"/>
-        <pc:sldMkLst>
-          <pc:docMk/>
-          <pc:sldMk cId="789250438" sldId="259"/>
-        </pc:sldMkLst>
-        <pc:spChg chg="mod">
-          <ac:chgData name="James Stevens" userId="c3e9a4fd0bc3e3ee" providerId="LiveId" clId="{C15F7F37-D4B4-4B60-873D-A3281FFED6D6}" dt="2025-03-18T23:55:00.974" v="1399" actId="20577"/>
-          <ac:spMkLst>
-            <pc:docMk/>
-            <pc:sldMk cId="789250438" sldId="259"/>
-            <ac:spMk id="2" creationId="{5BD0C4A9-4863-E226-9ACB-29F5D55F95D7}"/>
-          </ac:spMkLst>
-        </pc:spChg>
-        <pc:spChg chg="mod">
-          <ac:chgData name="James Stevens" userId="c3e9a4fd0bc3e3ee" providerId="LiveId" clId="{C15F7F37-D4B4-4B60-873D-A3281FFED6D6}" dt="2025-03-19T00:05:04.703" v="1965" actId="20577"/>
-          <ac:spMkLst>
-            <pc:docMk/>
-            <pc:sldMk cId="789250438" sldId="259"/>
-            <ac:spMk id="3" creationId="{2F2A8CFB-A63E-5009-65AB-C2DE5E43C7EB}"/>
-          </ac:spMkLst>
-        </pc:spChg>
-      </pc:sldChg>
-      <pc:sldChg chg="modSp new mod">
-        <pc:chgData name="James Stevens" userId="c3e9a4fd0bc3e3ee" providerId="LiveId" clId="{C15F7F37-D4B4-4B60-873D-A3281FFED6D6}" dt="2025-03-19T23:33:52.861" v="3541" actId="20577"/>
-        <pc:sldMkLst>
-          <pc:docMk/>
-          <pc:sldMk cId="1037164283" sldId="260"/>
-        </pc:sldMkLst>
-        <pc:spChg chg="mod">
-          <ac:chgData name="James Stevens" userId="c3e9a4fd0bc3e3ee" providerId="LiveId" clId="{C15F7F37-D4B4-4B60-873D-A3281FFED6D6}" dt="2025-03-19T00:05:40.525" v="1995" actId="20577"/>
-          <ac:spMkLst>
-            <pc:docMk/>
-            <pc:sldMk cId="1037164283" sldId="260"/>
-            <ac:spMk id="2" creationId="{33EC3D8C-5E46-7D29-728F-6B2AB80B10CE}"/>
-          </ac:spMkLst>
-        </pc:spChg>
-        <pc:spChg chg="mod">
-          <ac:chgData name="James Stevens" userId="c3e9a4fd0bc3e3ee" providerId="LiveId" clId="{C15F7F37-D4B4-4B60-873D-A3281FFED6D6}" dt="2025-03-19T23:33:52.861" v="3541" actId="20577"/>
-          <ac:spMkLst>
-            <pc:docMk/>
-            <pc:sldMk cId="1037164283" sldId="260"/>
-            <ac:spMk id="3" creationId="{D9228901-C915-AD1F-B1FF-AAD4105FF920}"/>
-          </ac:spMkLst>
-        </pc:spChg>
-      </pc:sldChg>
-      <pc:sldChg chg="modSp new mod">
-        <pc:chgData name="James Stevens" userId="c3e9a4fd0bc3e3ee" providerId="LiveId" clId="{C15F7F37-D4B4-4B60-873D-A3281FFED6D6}" dt="2025-03-19T23:21:28.314" v="2778" actId="20577"/>
-        <pc:sldMkLst>
-          <pc:docMk/>
-          <pc:sldMk cId="788907389" sldId="261"/>
-        </pc:sldMkLst>
-        <pc:spChg chg="mod">
-          <ac:chgData name="James Stevens" userId="c3e9a4fd0bc3e3ee" providerId="LiveId" clId="{C15F7F37-D4B4-4B60-873D-A3281FFED6D6}" dt="2025-03-19T23:19:07.569" v="2568" actId="20577"/>
-          <ac:spMkLst>
-            <pc:docMk/>
-            <pc:sldMk cId="788907389" sldId="261"/>
-            <ac:spMk id="2" creationId="{ED4DD94E-C096-E228-8A23-1C077F1077AD}"/>
-          </ac:spMkLst>
-        </pc:spChg>
-        <pc:spChg chg="mod">
-          <ac:chgData name="James Stevens" userId="c3e9a4fd0bc3e3ee" providerId="LiveId" clId="{C15F7F37-D4B4-4B60-873D-A3281FFED6D6}" dt="2025-03-19T23:21:28.314" v="2778" actId="20577"/>
-          <ac:spMkLst>
-            <pc:docMk/>
-            <pc:sldMk cId="788907389" sldId="261"/>
-            <ac:spMk id="3" creationId="{43C43EA5-133C-4E92-C4FA-69672215A98C}"/>
-          </ac:spMkLst>
-        </pc:spChg>
-      </pc:sldChg>
-      <pc:sldChg chg="modSp new mod">
-        <pc:chgData name="James Stevens" userId="c3e9a4fd0bc3e3ee" providerId="LiveId" clId="{C15F7F37-D4B4-4B60-873D-A3281FFED6D6}" dt="2025-03-19T23:35:56.604" v="3786" actId="20577"/>
-        <pc:sldMkLst>
-          <pc:docMk/>
-          <pc:sldMk cId="2391647526" sldId="262"/>
-        </pc:sldMkLst>
-        <pc:spChg chg="mod">
-          <ac:chgData name="James Stevens" userId="c3e9a4fd0bc3e3ee" providerId="LiveId" clId="{C15F7F37-D4B4-4B60-873D-A3281FFED6D6}" dt="2025-03-19T23:21:40.823" v="2800" actId="20577"/>
-          <ac:spMkLst>
-            <pc:docMk/>
-            <pc:sldMk cId="2391647526" sldId="262"/>
-            <ac:spMk id="2" creationId="{ED0B7677-1ABC-BAAA-04C1-26ECE2055A1E}"/>
-          </ac:spMkLst>
-        </pc:spChg>
-        <pc:spChg chg="mod">
-          <ac:chgData name="James Stevens" userId="c3e9a4fd0bc3e3ee" providerId="LiveId" clId="{C15F7F37-D4B4-4B60-873D-A3281FFED6D6}" dt="2025-03-19T23:35:56.604" v="3786" actId="20577"/>
-          <ac:spMkLst>
-            <pc:docMk/>
-            <pc:sldMk cId="2391647526" sldId="262"/>
-            <ac:spMk id="3" creationId="{0AF823A9-4490-299C-0FA6-86077B0F30FF}"/>
-          </ac:spMkLst>
-        </pc:spChg>
-      </pc:sldChg>
-      <pc:sldChg chg="modSp new mod">
-        <pc:chgData name="James Stevens" userId="c3e9a4fd0bc3e3ee" providerId="LiveId" clId="{C15F7F37-D4B4-4B60-873D-A3281FFED6D6}" dt="2025-03-19T23:37:07.572" v="4007" actId="20577"/>
-        <pc:sldMkLst>
-          <pc:docMk/>
-          <pc:sldMk cId="2561443158" sldId="263"/>
-        </pc:sldMkLst>
-        <pc:spChg chg="mod">
-          <ac:chgData name="James Stevens" userId="c3e9a4fd0bc3e3ee" providerId="LiveId" clId="{C15F7F37-D4B4-4B60-873D-A3281FFED6D6}" dt="2025-03-19T23:34:49.979" v="3623" actId="20577"/>
-          <ac:spMkLst>
-            <pc:docMk/>
-            <pc:sldMk cId="2561443158" sldId="263"/>
-            <ac:spMk id="2" creationId="{CD2F35AA-4507-037B-A9F5-320190A9FB8B}"/>
-          </ac:spMkLst>
-        </pc:spChg>
-        <pc:spChg chg="mod">
-          <ac:chgData name="James Stevens" userId="c3e9a4fd0bc3e3ee" providerId="LiveId" clId="{C15F7F37-D4B4-4B60-873D-A3281FFED6D6}" dt="2025-03-19T23:37:07.572" v="4007" actId="20577"/>
-          <ac:spMkLst>
-            <pc:docMk/>
-            <pc:sldMk cId="2561443158" sldId="263"/>
-            <ac:spMk id="3" creationId="{D35D3B8D-333D-6714-82EC-A4538EB8FAD9}"/>
-          </ac:spMkLst>
-        </pc:spChg>
-      </pc:sldChg>
-    </pc:docChg>
-  </pc:docChgLst>
-</pc:chgInfo>
-</file>
-
-<file path=ppt/comments/modernComment_102_305D3DB.xml><?xml version="1.0" encoding="utf-8"?>
-<p188:cmLst xmlns:a="http://schemas.openxmlformats.org/drawingml/2006/main" xmlns:r="http://schemas.openxmlformats.org/officeDocument/2006/relationships" xmlns:p188="http://schemas.microsoft.com/office/powerpoint/2018/8/main">
-  <p188:cm id="{7AB94E8E-EC1D-457D-A4C6-240AE88C2FC3}" authorId="{6292A766-2286-290A-C288-4626291D4076}" created="2025-03-20T18:49:02.253">
-    <ac:deMkLst xmlns:ac="http://schemas.microsoft.com/office/drawing/2013/main/command">
-      <pc:docMk xmlns:pc="http://schemas.microsoft.com/office/powerpoint/2013/main/command"/>
-      <pc:sldMk xmlns:pc="http://schemas.microsoft.com/office/powerpoint/2013/main/command" cId="50713563" sldId="258"/>
-      <ac:spMk id="3" creationId="{3B614977-DEAA-CED8-8257-A0E10A5DE0BB}"/>
-    </ac:deMkLst>
-    <p188:txBody>
-      <a:bodyPr/>
-      <a:lstStyle/>
-      <a:p>
-        <a:r>
-          <a:rPr lang="en-US"/>
-          <a:t>Not Sure our goal fits here?</a:t>
-        </a:r>
-      </a:p>
-    </p188:txBody>
-  </p188:cm>
-</p188:cmLst>
-</file>
-
 <file path=ppt/slideLayouts/slideLayout1.xml><?xml version="1.0" encoding="utf-8"?>
 <p:sldLayout xmlns:a="http://schemas.openxmlformats.org/drawingml/2006/main" xmlns:r="http://schemas.openxmlformats.org/officeDocument/2006/relationships" xmlns:p="http://schemas.openxmlformats.org/presentationml/2006/main" type="title" preserve="1">
   <p:cSld name="Title Slide">
@@ -632,7 +420,7 @@
           <a:p>
             <a:fld id="{6444479B-705B-4489-957E-7E8A228BDFA0}" type="datetime1">
               <a:rPr lang="en-US" smtClean="0"/>
-              <a:t>3/20/2025</a:t>
+              <a:t>3/21/2025</a:t>
             </a:fld>
             <a:endParaRPr lang="en-US"/>
           </a:p>
@@ -950,7 +738,7 @@
           <a:p>
             <a:fld id="{7DA38F49-B3E2-4BF0-BEC7-C30D34ABBB8D}" type="datetime1">
               <a:rPr lang="en-US" smtClean="0"/>
-              <a:t>3/20/2025</a:t>
+              <a:t>3/21/2025</a:t>
             </a:fld>
             <a:endParaRPr lang="en-US"/>
           </a:p>
@@ -1439,7 +1227,7 @@
           <a:p>
             <a:fld id="{7DA38F49-B3E2-4BF0-BEC7-C30D34ABBB8D}" type="datetime1">
               <a:rPr lang="en-US" smtClean="0"/>
-              <a:t>3/20/2025</a:t>
+              <a:t>3/21/2025</a:t>
             </a:fld>
             <a:endParaRPr lang="en-US"/>
           </a:p>
@@ -1809,7 +1597,7 @@
           <a:p>
             <a:fld id="{7DA38F49-B3E2-4BF0-BEC7-C30D34ABBB8D}" type="datetime1">
               <a:rPr lang="en-US" smtClean="0"/>
-              <a:t>3/20/2025</a:t>
+              <a:t>3/21/2025</a:t>
             </a:fld>
             <a:endParaRPr lang="en-US"/>
           </a:p>
@@ -2083,7 +1871,7 @@
           <a:p>
             <a:fld id="{C07B66AD-7C08-490A-ADA4-B47E10FB2407}" type="datetime1">
               <a:rPr lang="en-US" smtClean="0"/>
-              <a:t>3/20/2025</a:t>
+              <a:t>3/21/2025</a:t>
             </a:fld>
             <a:endParaRPr lang="en-US"/>
           </a:p>
@@ -2368,7 +2156,7 @@
           <a:p>
             <a:fld id="{05B95027-4255-49E7-9841-CD21BCC99996}" type="datetime1">
               <a:rPr lang="en-US" smtClean="0"/>
-              <a:t>3/20/2025</a:t>
+              <a:t>3/21/2025</a:t>
             </a:fld>
             <a:endParaRPr lang="en-US"/>
           </a:p>
@@ -2651,7 +2439,7 @@
           <a:p>
             <a:fld id="{9F89F774-3FA6-43B8-9241-99959C8FD463}" type="datetime1">
               <a:rPr lang="en-US" smtClean="0"/>
-              <a:t>3/20/2025</a:t>
+              <a:t>3/21/2025</a:t>
             </a:fld>
             <a:endParaRPr lang="en-US"/>
           </a:p>
@@ -2994,7 +2782,7 @@
           <a:p>
             <a:fld id="{F9504452-5DCC-4FE2-A5C9-8A5EF6714D65}" type="datetime1">
               <a:rPr lang="en-US" smtClean="0"/>
-              <a:t>3/20/2025</a:t>
+              <a:t>3/21/2025</a:t>
             </a:fld>
             <a:endParaRPr lang="en-US"/>
           </a:p>
@@ -3333,7 +3121,7 @@
           <a:p>
             <a:fld id="{E579ABC2-0180-4F3A-A895-A85BC724D472}" type="datetime1">
               <a:rPr lang="en-US" smtClean="0"/>
-              <a:t>3/20/2025</a:t>
+              <a:t>3/21/2025</a:t>
             </a:fld>
             <a:endParaRPr lang="en-US"/>
           </a:p>
@@ -3810,7 +3598,7 @@
           <a:p>
             <a:fld id="{6AEEA9BA-4E8F-439E-BEA4-91FBA01E3F5F}" type="datetime1">
               <a:rPr lang="en-US" smtClean="0"/>
-              <a:t>3/20/2025</a:t>
+              <a:t>3/21/2025</a:t>
             </a:fld>
             <a:endParaRPr lang="en-US"/>
           </a:p>
@@ -4031,7 +3819,7 @@
           <a:p>
             <a:fld id="{BE15BF18-0007-481C-AA29-413124BC3EE7}" type="datetime1">
               <a:rPr lang="en-US" smtClean="0"/>
-              <a:t>3/20/2025</a:t>
+              <a:t>3/21/2025</a:t>
             </a:fld>
             <a:endParaRPr lang="en-US"/>
           </a:p>
@@ -4126,7 +3914,7 @@
           <a:p>
             <a:fld id="{09BE9870-3748-43AD-B547-02A075CB4A1D}" type="datetime1">
               <a:rPr lang="en-US" smtClean="0"/>
-              <a:t>3/20/2025</a:t>
+              <a:t>3/21/2025</a:t>
             </a:fld>
             <a:endParaRPr lang="en-US"/>
           </a:p>
@@ -4593,7 +4381,7 @@
           <a:p>
             <a:fld id="{558E7897-33C5-4F1A-9307-D068E37F3DC7}" type="datetime1">
               <a:rPr lang="en-US" smtClean="0"/>
-              <a:t>3/20/2025</a:t>
+              <a:t>3/21/2025</a:t>
             </a:fld>
             <a:endParaRPr lang="en-US"/>
           </a:p>
@@ -4906,7 +4694,7 @@
           <a:p>
             <a:fld id="{7DA38F49-B3E2-4BF0-BEC7-C30D34ABBB8D}" type="datetime1">
               <a:rPr lang="en-US" smtClean="0"/>
-              <a:t>3/20/2025</a:t>
+              <a:t>3/21/2025</a:t>
             </a:fld>
             <a:endParaRPr lang="en-US"/>
           </a:p>
@@ -5177,7 +4965,7 @@
           <a:p>
             <a:fld id="{7DA38F49-B3E2-4BF0-BEC7-C30D34ABBB8D}" type="datetime1">
               <a:rPr lang="en-US" smtClean="0"/>
-              <a:t>3/20/2025</a:t>
+              <a:t>3/21/2025</a:t>
             </a:fld>
             <a:endParaRPr lang="en-US"/>
           </a:p>
@@ -6010,7 +5798,7 @@
                   <a:schemeClr val="bg1"/>
                 </a:solidFill>
               </a:rPr>
-              <a:t>The goal of our project was to design and implement an AI tutor for an introductory C++ programming course. </a:t>
+              <a:t>The goal of our project was to design and implement an AI tutor for an introductory C++ programming course</a:t>
             </a:r>
           </a:p>
           <a:p>
@@ -6020,7 +5808,7 @@
                   <a:schemeClr val="bg1"/>
                 </a:solidFill>
               </a:rPr>
-              <a:t>We utilized a RAG method to provide an effective framework for learning. </a:t>
+              <a:t>We utilized a RAG method to provide an effective framework for learning</a:t>
             </a:r>
           </a:p>
           <a:p>
@@ -6030,7 +5818,7 @@
                   <a:schemeClr val="bg1"/>
                 </a:solidFill>
               </a:rPr>
-              <a:t>The responses are drawn from a strict data pool. This framework ensures relevant, concise responses to user queries. </a:t>
+              <a:t>The responses are drawn from a strict data pool. This framework ensures relevant, concise responses to user queries</a:t>
             </a:r>
           </a:p>
           <a:p>
@@ -6040,7 +5828,7 @@
                   <a:schemeClr val="bg1"/>
                 </a:solidFill>
               </a:rPr>
-              <a:t>We aim to eliminate the drawbacks of typical AI generation which includes hallucination.</a:t>
+              <a:t>We aim to eliminate the drawbacks of typical AI generation which includes hallucination</a:t>
             </a:r>
           </a:p>
         </p:txBody>
@@ -6064,7 +5852,7 @@
     <p:bg>
       <p:bgPr>
         <a:blipFill dpi="0" rotWithShape="1">
-          <a:blip r:embed="rId3">
+          <a:blip r:embed="rId2">
             <a:lum/>
           </a:blip>
           <a:srcRect/>
@@ -6144,7 +5932,7 @@
                   <a:schemeClr val="bg1"/>
                 </a:solidFill>
               </a:rPr>
-              <a:t>Our goal was to create an effective, concise RAG tutor for an introductory C++ course. </a:t>
+              <a:t>Our goal was to create an effective, concise RAG tutor for an introductory C++ course</a:t>
             </a:r>
           </a:p>
           <a:p>
@@ -6154,17 +5942,83 @@
                   <a:schemeClr val="bg1"/>
                 </a:solidFill>
               </a:rPr>
-              <a:t>Some initial challenges we faced included implementation in C++ itself, communication within the RAG pipeline, the lack of libraries for support in C++ seemingly forced us to use a Python framework. </a:t>
-            </a:r>
-          </a:p>
-          <a:p>
+              <a:t>Initial challenges included:</a:t>
+            </a:r>
+          </a:p>
+          <a:p>
+            <a:pPr lvl="1"/>
             <a:r>
               <a:rPr lang="en-US" dirty="0">
                 <a:solidFill>
                   <a:schemeClr val="bg1"/>
                 </a:solidFill>
               </a:rPr>
-              <a:t>Other challenges we faced were how to generate the most accurate responses based on the data files we supplied the RAG, how to minimize hallucination, and inappropriate answers. </a:t>
+              <a:t>implementation in C++ itself</a:t>
+            </a:r>
+          </a:p>
+          <a:p>
+            <a:pPr lvl="1"/>
+            <a:r>
+              <a:rPr lang="en-US" dirty="0">
+                <a:solidFill>
+                  <a:schemeClr val="bg1"/>
+                </a:solidFill>
+              </a:rPr>
+              <a:t>communication within the RAG pipeline</a:t>
+            </a:r>
+          </a:p>
+          <a:p>
+            <a:pPr lvl="1"/>
+            <a:r>
+              <a:rPr lang="en-US" dirty="0">
+                <a:solidFill>
+                  <a:schemeClr val="bg1"/>
+                </a:solidFill>
+              </a:rPr>
+              <a:t>the lack of supported vector database libraries in C++ forced us to use a Python framework</a:t>
+            </a:r>
+          </a:p>
+          <a:p>
+            <a:r>
+              <a:rPr lang="en-US" dirty="0">
+                <a:solidFill>
+                  <a:schemeClr val="bg1"/>
+                </a:solidFill>
+              </a:rPr>
+              <a:t>Other challenges encountered:</a:t>
+            </a:r>
+          </a:p>
+          <a:p>
+            <a:pPr lvl="1"/>
+            <a:r>
+              <a:rPr lang="en-US" dirty="0">
+                <a:solidFill>
+                  <a:schemeClr val="bg1"/>
+                </a:solidFill>
+              </a:rPr>
+              <a:t>how to generate the most accurate responses based on the data files we supplied the RAG</a:t>
+            </a:r>
+          </a:p>
+          <a:p>
+            <a:pPr lvl="1"/>
+            <a:r>
+              <a:rPr lang="en-US" dirty="0">
+                <a:solidFill>
+                  <a:schemeClr val="bg1"/>
+                </a:solidFill>
+              </a:rPr>
+              <a:t>how to minimize hallucination</a:t>
+            </a:r>
+          </a:p>
+          <a:p>
+            <a:pPr lvl="1"/>
+            <a:r>
+              <a:rPr lang="en-US" dirty="0">
+                <a:solidFill>
+                  <a:schemeClr val="bg1"/>
+                </a:solidFill>
+              </a:rPr>
+              <a:t>inappropriate answers</a:t>
             </a:r>
           </a:p>
         </p:txBody>
@@ -6179,11 +6033,6 @@
   <p:clrMapOvr>
     <a:masterClrMapping/>
   </p:clrMapOvr>
-  <p:extLst>
-    <p:ext uri="{6950BFC3-D8DA-4A85-94F7-54DA5524770B}">
-      <p188:commentRel xmlns:p188="http://schemas.microsoft.com/office/powerpoint/2018/8/main" r:id="rId2"/>
-    </p:ext>
-  </p:extLst>
 </p:sld>
 </file>
 
@@ -6241,7 +6090,7 @@
           <a:p>
             <a:r>
               <a:rPr lang="en-US" dirty="0"/>
-              <a:t>Retrieval-Augmented Generation</a:t>
+              <a:t>Retrieval-Augmented Generation (RAG)</a:t>
             </a:r>
           </a:p>
         </p:txBody>
@@ -6273,47 +6122,51 @@
                   <a:schemeClr val="bg1"/>
                 </a:solidFill>
               </a:rPr>
-              <a:t>This algorithm enhances the performance of generative AI models. </a:t>
-            </a:r>
-          </a:p>
-          <a:p>
+              <a:t>This algorithm enhances the performance of generative AI models</a:t>
+            </a:r>
+          </a:p>
+          <a:p>
+            <a:pPr lvl="1"/>
             <a:r>
               <a:rPr lang="en-US" dirty="0">
                 <a:solidFill>
                   <a:schemeClr val="bg1"/>
                 </a:solidFill>
               </a:rPr>
-              <a:t>Begins with indexing of data from relevant sources/documents in a vector database.</a:t>
-            </a:r>
-          </a:p>
-          <a:p>
+              <a:t>It begins with indexing of data from relevant sources/documents in a vector database</a:t>
+            </a:r>
+          </a:p>
+          <a:p>
+            <a:pPr lvl="1"/>
             <a:r>
               <a:rPr lang="en-US" dirty="0">
                 <a:solidFill>
                   <a:schemeClr val="bg1"/>
                 </a:solidFill>
               </a:rPr>
-              <a:t>Next it retrieves the most accurate information based on a similarity search. </a:t>
-            </a:r>
-          </a:p>
-          <a:p>
+              <a:t>Next it retrieves the most accurate information based on a similarity search</a:t>
+            </a:r>
+          </a:p>
+          <a:p>
+            <a:pPr lvl="1"/>
             <a:r>
               <a:rPr lang="en-US" dirty="0">
                 <a:solidFill>
                   <a:schemeClr val="bg1"/>
                 </a:solidFill>
               </a:rPr>
-              <a:t>Augmentation occurs when info is supplied to the LLM along with the user query. </a:t>
-            </a:r>
-          </a:p>
-          <a:p>
+              <a:t>Augmentation occurs when info is supplied to the LLM along with the user query</a:t>
+            </a:r>
+          </a:p>
+          <a:p>
+            <a:pPr lvl="1"/>
             <a:r>
               <a:rPr lang="en-US" dirty="0">
                 <a:solidFill>
                   <a:schemeClr val="bg1"/>
                 </a:solidFill>
               </a:rPr>
-              <a:t>The generated response is created based on its knowledge and the supplied data. </a:t>
+              <a:t>The generated response is created based on its knowledge and the supplied data</a:t>
             </a:r>
           </a:p>
           <a:p>
@@ -6436,7 +6289,7 @@
                   <a:schemeClr val="bg1"/>
                 </a:solidFill>
               </a:rPr>
-              <a:t> as our data files.</a:t>
+              <a:t> as our data files</a:t>
             </a:r>
           </a:p>
           <a:p>
@@ -6446,7 +6299,7 @@
                   <a:schemeClr val="bg1"/>
                 </a:solidFill>
               </a:rPr>
-              <a:t>The textbook provided updated, accurate information to supplement the LLM in response to user queries. </a:t>
+              <a:t>The textbook provided updated, accurate information to supplement the LLM in response to user queries</a:t>
             </a:r>
           </a:p>
           <a:p>
@@ -6456,7 +6309,7 @@
                   <a:schemeClr val="bg1"/>
                 </a:solidFill>
               </a:rPr>
-              <a:t>Implementation of the tutor began with communicating with the LLM and then integrating the RAG system. </a:t>
+              <a:t>We began implementing the tutor by communicating with the LLM and then integrating the RAG system</a:t>
             </a:r>
           </a:p>
           <a:p>
@@ -6466,7 +6319,7 @@
                   <a:schemeClr val="bg1"/>
                 </a:solidFill>
               </a:rPr>
-              <a:t>Backend is an API so anyone can attach their own front-end of their preference</a:t>
+              <a:t>Backend is an API so anyone can attach a front-end of their preference</a:t>
             </a:r>
           </a:p>
         </p:txBody>
@@ -6570,75 +6423,37 @@
                   <a:schemeClr val="bg1"/>
                 </a:solidFill>
               </a:rPr>
-              <a:t>The backend is built in a Python framework with </a:t>
-            </a:r>
-            <a:r>
-              <a:rPr lang="en-US" dirty="0" err="1">
+              <a:t>The backend is built in Python with ChromaDB and Ollama</a:t>
+            </a:r>
+          </a:p>
+          <a:p>
+            <a:r>
+              <a:rPr lang="en-US" dirty="0">
                 <a:solidFill>
                   <a:schemeClr val="bg1"/>
                 </a:solidFill>
               </a:rPr>
-              <a:t>ChromaDB</a:t>
-            </a:r>
+              <a:t>We used llama 3.2 for our LLM</a:t>
+            </a:r>
+          </a:p>
+          <a:p>
             <a:r>
               <a:rPr lang="en-US" dirty="0">
                 <a:solidFill>
                   <a:schemeClr val="bg1"/>
                 </a:solidFill>
               </a:rPr>
-              <a:t> and </a:t>
-            </a:r>
-            <a:r>
-              <a:rPr lang="en-US" dirty="0" err="1">
+              <a:t>The user interface was made with JavaScript and HTML/CSS</a:t>
+            </a:r>
+          </a:p>
+          <a:p>
+            <a:r>
+              <a:rPr lang="en-US" dirty="0">
                 <a:solidFill>
                   <a:schemeClr val="bg1"/>
                 </a:solidFill>
               </a:rPr>
-              <a:t>Ollama</a:t>
-            </a:r>
-            <a:r>
-              <a:rPr lang="en-US" dirty="0">
-                <a:solidFill>
-                  <a:schemeClr val="bg1"/>
-                </a:solidFill>
-              </a:rPr>
-              <a:t> 3.2.</a:t>
-            </a:r>
-          </a:p>
-          <a:p>
-            <a:r>
-              <a:rPr lang="en-US" dirty="0">
-                <a:solidFill>
-                  <a:schemeClr val="bg1"/>
-                </a:solidFill>
-              </a:rPr>
-              <a:t>The user interface was made in </a:t>
-            </a:r>
-            <a:r>
-              <a:rPr lang="en-US" dirty="0" err="1">
-                <a:solidFill>
-                  <a:schemeClr val="bg1"/>
-                </a:solidFill>
-              </a:rPr>
-              <a:t>Javascript</a:t>
-            </a:r>
-            <a:r>
-              <a:rPr lang="en-US" dirty="0">
-                <a:solidFill>
-                  <a:schemeClr val="bg1"/>
-                </a:solidFill>
-              </a:rPr>
-              <a:t>.</a:t>
-            </a:r>
-          </a:p>
-          <a:p>
-            <a:r>
-              <a:rPr lang="en-US" dirty="0">
-                <a:solidFill>
-                  <a:schemeClr val="bg1"/>
-                </a:solidFill>
-              </a:rPr>
-              <a:t>Testing supplemented by XAMPP.</a:t>
+              <a:t>Testing supplemented by XAMPP</a:t>
             </a:r>
           </a:p>
         </p:txBody>
@@ -6742,7 +6557,7 @@
                   <a:schemeClr val="bg1"/>
                 </a:solidFill>
               </a:rPr>
-              <a:t>The chat tutor is fully-functional and will answer students’ queries with accurate generated responses. </a:t>
+              <a:t>The chat tutor is fully-functional and will answer students’ queries, generating accurate responses</a:t>
             </a:r>
           </a:p>
           <a:p>
@@ -6752,7 +6567,7 @@
                   <a:schemeClr val="bg1"/>
                 </a:solidFill>
               </a:rPr>
-              <a:t>The responses are cited by the section of the textbook the information is drawn from. Subject matter ranges from variables to vectors. </a:t>
+              <a:t>The responses cite the section of the textbook that the information is retrieved from</a:t>
             </a:r>
           </a:p>
           <a:p>
@@ -6762,7 +6577,7 @@
                   <a:schemeClr val="bg1"/>
                 </a:solidFill>
               </a:rPr>
-              <a:t>The Python RAG pipeline is more resource intensive than a C++ build, but it is still effective and developer-friendly. </a:t>
+              <a:t>The Python RAG pipeline is slightly more resource intensive than a C++ build, but is still effective and developer-friendly</a:t>
             </a:r>
           </a:p>
           <a:p>
@@ -6772,7 +6587,7 @@
                   <a:schemeClr val="bg1"/>
                 </a:solidFill>
               </a:rPr>
-              <a:t>Anyone can host the API and tailor it to their needs. </a:t>
+              <a:t>Anyone can host the API and tailor it to their needs</a:t>
             </a:r>
           </a:p>
           <a:p>
@@ -6882,7 +6697,7 @@
                   <a:schemeClr val="bg1"/>
                 </a:solidFill>
               </a:rPr>
-              <a:t>A simple yet effective Python implementation that provides concise answers to user queries. </a:t>
+              <a:t>An effective Python implementation that provides concise answers to user queries</a:t>
             </a:r>
           </a:p>
           <a:p>
@@ -6892,7 +6707,7 @@
                   <a:schemeClr val="bg1"/>
                 </a:solidFill>
               </a:rPr>
-              <a:t>This would be a great tool for any beginning programmer in C++. </a:t>
+              <a:t>A great tool for any beginning programmer in C++</a:t>
             </a:r>
           </a:p>
           <a:p>
@@ -6902,7 +6717,7 @@
                   <a:schemeClr val="bg1"/>
                 </a:solidFill>
               </a:rPr>
-              <a:t>Anyone that wants to customize their own front-end can do so easily and interchangeably with our RAG framework in Python.</a:t>
+              <a:t>Bulit as an API, the RAG framework allows for custom frontends</a:t>
             </a:r>
           </a:p>
         </p:txBody>

</xml_diff>